<commit_message>
Atualiza ebook e pptx
</commit_message>
<xml_diff>
--- a/images/3-async-call-ajax.pptx
+++ b/images/3-async-call-ajax.pptx
@@ -199,7 +199,7 @@
           <a:p>
             <a:fld id="{40ACC6E3-AF7A-7946-AED0-0A9E30E6CB59}" type="datetimeFigureOut">
               <a:rPr lang="en-US" smtClean="0"/>
-              <a:t>9/27/18</a:t>
+              <a:t>8/27/19</a:t>
             </a:fld>
             <a:endParaRPr lang="en-US"/>
           </a:p>
@@ -981,7 +981,7 @@
           <a:p>
             <a:fld id="{70D01A08-6681-9849-9BAF-A7757C293554}" type="datetimeFigureOut">
               <a:rPr lang="en-US" smtClean="0"/>
-              <a:t>9/27/18</a:t>
+              <a:t>8/27/19</a:t>
             </a:fld>
             <a:endParaRPr lang="en-US"/>
           </a:p>
@@ -1146,7 +1146,7 @@
           <a:p>
             <a:fld id="{70D01A08-6681-9849-9BAF-A7757C293554}" type="datetimeFigureOut">
               <a:rPr lang="en-US" smtClean="0"/>
-              <a:t>9/27/18</a:t>
+              <a:t>8/27/19</a:t>
             </a:fld>
             <a:endParaRPr lang="en-US"/>
           </a:p>
@@ -1321,7 +1321,7 @@
           <a:p>
             <a:fld id="{70D01A08-6681-9849-9BAF-A7757C293554}" type="datetimeFigureOut">
               <a:rPr lang="en-US" smtClean="0"/>
-              <a:t>9/27/18</a:t>
+              <a:t>8/27/19</a:t>
             </a:fld>
             <a:endParaRPr lang="en-US"/>
           </a:p>
@@ -1486,7 +1486,7 @@
           <a:p>
             <a:fld id="{70D01A08-6681-9849-9BAF-A7757C293554}" type="datetimeFigureOut">
               <a:rPr lang="en-US" smtClean="0"/>
-              <a:t>9/27/18</a:t>
+              <a:t>8/27/19</a:t>
             </a:fld>
             <a:endParaRPr lang="en-US"/>
           </a:p>
@@ -1727,7 +1727,7 @@
           <a:p>
             <a:fld id="{70D01A08-6681-9849-9BAF-A7757C293554}" type="datetimeFigureOut">
               <a:rPr lang="en-US" smtClean="0"/>
-              <a:t>9/27/18</a:t>
+              <a:t>8/27/19</a:t>
             </a:fld>
             <a:endParaRPr lang="en-US"/>
           </a:p>
@@ -1954,7 +1954,7 @@
           <a:p>
             <a:fld id="{70D01A08-6681-9849-9BAF-A7757C293554}" type="datetimeFigureOut">
               <a:rPr lang="en-US" smtClean="0"/>
-              <a:t>9/27/18</a:t>
+              <a:t>8/27/19</a:t>
             </a:fld>
             <a:endParaRPr lang="en-US"/>
           </a:p>
@@ -2316,7 +2316,7 @@
           <a:p>
             <a:fld id="{70D01A08-6681-9849-9BAF-A7757C293554}" type="datetimeFigureOut">
               <a:rPr lang="en-US" smtClean="0"/>
-              <a:t>9/27/18</a:t>
+              <a:t>8/27/19</a:t>
             </a:fld>
             <a:endParaRPr lang="en-US"/>
           </a:p>
@@ -2429,7 +2429,7 @@
           <a:p>
             <a:fld id="{70D01A08-6681-9849-9BAF-A7757C293554}" type="datetimeFigureOut">
               <a:rPr lang="en-US" smtClean="0"/>
-              <a:t>9/27/18</a:t>
+              <a:t>8/27/19</a:t>
             </a:fld>
             <a:endParaRPr lang="en-US"/>
           </a:p>
@@ -2519,7 +2519,7 @@
           <a:p>
             <a:fld id="{70D01A08-6681-9849-9BAF-A7757C293554}" type="datetimeFigureOut">
               <a:rPr lang="en-US" smtClean="0"/>
-              <a:t>9/27/18</a:t>
+              <a:t>8/27/19</a:t>
             </a:fld>
             <a:endParaRPr lang="en-US"/>
           </a:p>
@@ -2791,7 +2791,7 @@
           <a:p>
             <a:fld id="{70D01A08-6681-9849-9BAF-A7757C293554}" type="datetimeFigureOut">
               <a:rPr lang="en-US" smtClean="0"/>
-              <a:t>9/27/18</a:t>
+              <a:t>8/27/19</a:t>
             </a:fld>
             <a:endParaRPr lang="en-US"/>
           </a:p>
@@ -3042,7 +3042,7 @@
           <a:p>
             <a:fld id="{70D01A08-6681-9849-9BAF-A7757C293554}" type="datetimeFigureOut">
               <a:rPr lang="en-US" smtClean="0"/>
-              <a:t>9/27/18</a:t>
+              <a:t>8/27/19</a:t>
             </a:fld>
             <a:endParaRPr lang="en-US"/>
           </a:p>
@@ -3250,7 +3250,7 @@
           <a:p>
             <a:fld id="{70D01A08-6681-9849-9BAF-A7757C293554}" type="datetimeFigureOut">
               <a:rPr lang="en-US" smtClean="0"/>
-              <a:t>9/27/18</a:t>
+              <a:t>8/27/19</a:t>
             </a:fld>
             <a:endParaRPr lang="en-US"/>
           </a:p>

</xml_diff>